<commit_message>
feat: Implement LLM-driven code-to-visual synchronization services and add backend Dockerization.
</commit_message>
<xml_diff>
--- a/Nebula-Cloud (1).pptx
+++ b/Nebula-Cloud (1).pptx
@@ -6433,7 +6433,7 @@
           <p:nvPr>
             <p:extLst>
               <p:ext uri="{D42A27DB-BD31-4B8C-83A1-F6EECF244321}">
-                <p14:modId xmlns:p14="http://schemas.microsoft.com/office/powerpoint/2010/main" val="1606523329"/>
+                <p14:modId xmlns:p14="http://schemas.microsoft.com/office/powerpoint/2010/main" val="225963795"/>
               </p:ext>
             </p:extLst>
           </p:nvPr>
@@ -6950,9 +6950,10 @@
                     <a:lstStyle/>
                     <a:p>
                       <a:r>
-                        <a:rPr lang="en-US" dirty="0"/>
-                        <a:t>Fronted Developer</a:t>
+                        <a:rPr lang="en-IN" dirty="0"/>
+                        <a:t>Frontend Developer</a:t>
                       </a:r>
+                      <a:endParaRPr lang="en-US" dirty="0"/>
                     </a:p>
                   </a:txBody>
                   <a:tcPr>

</xml_diff>